<commit_message>
Updated to final version
</commit_message>
<xml_diff>
--- a/Which Industry has the Highest Levels of Revenue.pptx
+++ b/Which Industry has the Highest Levels of Revenue.pptx
@@ -150,14 +150,13 @@
               </a:defRPr>
             </a:pPr>
             <a:r>
-              <a:rPr lang="en-US" sz="2800" b="1"/>
-              <a:t>GIS Sector Revenue</a:t>
-            </a:r>
-            <a:r>
-              <a:rPr lang="en-US" sz="2800" b="1" baseline="0"/>
-              <a:t> Totals and Average</a:t>
-            </a:r>
-            <a:endParaRPr lang="en-US" sz="2800" b="1"/>
+              <a:rPr lang="en-US" sz="2800" b="1" dirty="0"/>
+              <a:t>GIS Sector Revenue </a:t>
+            </a:r>
+            <a:r>
+              <a:rPr lang="en-US" sz="2800" b="1" baseline="0" dirty="0"/>
+              <a:t>Totals</a:t>
+            </a:r>
           </a:p>
         </c:rich>
       </c:tx>
@@ -742,6 +741,61 @@
         </c:scaling>
         <c:delete val="0"/>
         <c:axPos val="b"/>
+        <c:title>
+          <c:tx>
+            <c:rich>
+              <a:bodyPr rot="0" spcFirstLastPara="1" vertOverflow="ellipsis" vert="horz" wrap="square" anchor="ctr" anchorCtr="1"/>
+              <a:lstStyle/>
+              <a:p>
+                <a:pPr>
+                  <a:defRPr sz="900" b="0" i="0" u="none" strike="noStrike" kern="1200" cap="all" baseline="0">
+                    <a:solidFill>
+                      <a:schemeClr val="tx1">
+                        <a:lumMod val="65000"/>
+                        <a:lumOff val="35000"/>
+                      </a:schemeClr>
+                    </a:solidFill>
+                    <a:latin typeface="+mn-lt"/>
+                    <a:ea typeface="+mn-ea"/>
+                    <a:cs typeface="+mn-cs"/>
+                  </a:defRPr>
+                </a:pPr>
+                <a:r>
+                  <a:rPr lang="en-US" dirty="0"/>
+                  <a:t>Industry</a:t>
+                </a:r>
+              </a:p>
+            </c:rich>
+          </c:tx>
+          <c:overlay val="0"/>
+          <c:spPr>
+            <a:noFill/>
+            <a:ln>
+              <a:noFill/>
+            </a:ln>
+            <a:effectLst/>
+          </c:spPr>
+          <c:txPr>
+            <a:bodyPr rot="0" spcFirstLastPara="1" vertOverflow="ellipsis" vert="horz" wrap="square" anchor="ctr" anchorCtr="1"/>
+            <a:lstStyle/>
+            <a:p>
+              <a:pPr>
+                <a:defRPr sz="900" b="0" i="0" u="none" strike="noStrike" kern="1200" cap="all" baseline="0">
+                  <a:solidFill>
+                    <a:schemeClr val="tx1">
+                      <a:lumMod val="65000"/>
+                      <a:lumOff val="35000"/>
+                    </a:schemeClr>
+                  </a:solidFill>
+                  <a:latin typeface="+mn-lt"/>
+                  <a:ea typeface="+mn-ea"/>
+                  <a:cs typeface="+mn-cs"/>
+                </a:defRPr>
+              </a:pPr>
+              <a:endParaRPr lang="en-US"/>
+            </a:p>
+          </c:txPr>
+        </c:title>
         <c:numFmt formatCode="General" sourceLinked="1"/>
         <c:majorTickMark val="out"/>
         <c:minorTickMark val="none"/>
@@ -821,6 +875,65 @@
             <a:effectLst/>
           </c:spPr>
         </c:minorGridlines>
+        <c:title>
+          <c:tx>
+            <c:rich>
+              <a:bodyPr rot="-5400000" spcFirstLastPara="1" vertOverflow="ellipsis" vert="horz" wrap="square" anchor="ctr" anchorCtr="1"/>
+              <a:lstStyle/>
+              <a:p>
+                <a:pPr>
+                  <a:defRPr sz="900" b="0" i="0" u="none" strike="noStrike" kern="1200" cap="all" baseline="0">
+                    <a:solidFill>
+                      <a:schemeClr val="tx1">
+                        <a:lumMod val="65000"/>
+                        <a:lumOff val="35000"/>
+                      </a:schemeClr>
+                    </a:solidFill>
+                    <a:latin typeface="+mn-lt"/>
+                    <a:ea typeface="+mn-ea"/>
+                    <a:cs typeface="+mn-cs"/>
+                  </a:defRPr>
+                </a:pPr>
+                <a:r>
+                  <a:rPr lang="en-US" dirty="0"/>
+                  <a:t>Total</a:t>
+                </a:r>
+                <a:r>
+                  <a:rPr lang="en-US" baseline="0" dirty="0"/>
+                  <a:t> revenue</a:t>
+                </a:r>
+              </a:p>
+            </c:rich>
+          </c:tx>
+          <c:overlay val="0"/>
+          <c:spPr>
+            <a:noFill/>
+            <a:ln>
+              <a:noFill/>
+            </a:ln>
+            <a:effectLst/>
+          </c:spPr>
+          <c:txPr>
+            <a:bodyPr rot="-5400000" spcFirstLastPara="1" vertOverflow="ellipsis" vert="horz" wrap="square" anchor="ctr" anchorCtr="1"/>
+            <a:lstStyle/>
+            <a:p>
+              <a:pPr>
+                <a:defRPr sz="900" b="0" i="0" u="none" strike="noStrike" kern="1200" cap="all" baseline="0">
+                  <a:solidFill>
+                    <a:schemeClr val="tx1">
+                      <a:lumMod val="65000"/>
+                      <a:lumOff val="35000"/>
+                    </a:schemeClr>
+                  </a:solidFill>
+                  <a:latin typeface="+mn-lt"/>
+                  <a:ea typeface="+mn-ea"/>
+                  <a:cs typeface="+mn-cs"/>
+                </a:defRPr>
+              </a:pPr>
+              <a:endParaRPr lang="en-US"/>
+            </a:p>
+          </c:txPr>
+        </c:title>
         <c:numFmt formatCode="_(&quot;$&quot;* #,##0.00_);_(&quot;$&quot;* \(#,##0.00\);_(&quot;$&quot;* &quot;-&quot;??_);_(@_)" sourceLinked="1"/>
         <c:majorTickMark val="none"/>
         <c:minorTickMark val="none"/>
@@ -1638,7 +1751,7 @@
           <a:p>
             <a:fld id="{6BA97E48-4B77-47E2-9936-39CB2FA99A68}" type="datetimeFigureOut">
               <a:rPr lang="en-US" smtClean="0"/>
-              <a:t>8/24/2019</a:t>
+              <a:t>8/25/2019</a:t>
             </a:fld>
             <a:endParaRPr lang="en-US"/>
           </a:p>
@@ -1836,7 +1949,7 @@
           <a:p>
             <a:fld id="{6BA97E48-4B77-47E2-9936-39CB2FA99A68}" type="datetimeFigureOut">
               <a:rPr lang="en-US" smtClean="0"/>
-              <a:t>8/24/2019</a:t>
+              <a:t>8/25/2019</a:t>
             </a:fld>
             <a:endParaRPr lang="en-US"/>
           </a:p>
@@ -2044,7 +2157,7 @@
           <a:p>
             <a:fld id="{6BA97E48-4B77-47E2-9936-39CB2FA99A68}" type="datetimeFigureOut">
               <a:rPr lang="en-US" smtClean="0"/>
-              <a:t>8/24/2019</a:t>
+              <a:t>8/25/2019</a:t>
             </a:fld>
             <a:endParaRPr lang="en-US"/>
           </a:p>
@@ -2242,7 +2355,7 @@
           <a:p>
             <a:fld id="{6BA97E48-4B77-47E2-9936-39CB2FA99A68}" type="datetimeFigureOut">
               <a:rPr lang="en-US" smtClean="0"/>
-              <a:t>8/24/2019</a:t>
+              <a:t>8/25/2019</a:t>
             </a:fld>
             <a:endParaRPr lang="en-US"/>
           </a:p>
@@ -2517,7 +2630,7 @@
           <a:p>
             <a:fld id="{6BA97E48-4B77-47E2-9936-39CB2FA99A68}" type="datetimeFigureOut">
               <a:rPr lang="en-US" smtClean="0"/>
-              <a:t>8/24/2019</a:t>
+              <a:t>8/25/2019</a:t>
             </a:fld>
             <a:endParaRPr lang="en-US"/>
           </a:p>
@@ -2782,7 +2895,7 @@
           <a:p>
             <a:fld id="{6BA97E48-4B77-47E2-9936-39CB2FA99A68}" type="datetimeFigureOut">
               <a:rPr lang="en-US" smtClean="0"/>
-              <a:t>8/24/2019</a:t>
+              <a:t>8/25/2019</a:t>
             </a:fld>
             <a:endParaRPr lang="en-US"/>
           </a:p>
@@ -3194,7 +3307,7 @@
           <a:p>
             <a:fld id="{6BA97E48-4B77-47E2-9936-39CB2FA99A68}" type="datetimeFigureOut">
               <a:rPr lang="en-US" smtClean="0"/>
-              <a:t>8/24/2019</a:t>
+              <a:t>8/25/2019</a:t>
             </a:fld>
             <a:endParaRPr lang="en-US"/>
           </a:p>
@@ -3335,7 +3448,7 @@
           <a:p>
             <a:fld id="{6BA97E48-4B77-47E2-9936-39CB2FA99A68}" type="datetimeFigureOut">
               <a:rPr lang="en-US" smtClean="0"/>
-              <a:t>8/24/2019</a:t>
+              <a:t>8/25/2019</a:t>
             </a:fld>
             <a:endParaRPr lang="en-US"/>
           </a:p>
@@ -3448,7 +3561,7 @@
           <a:p>
             <a:fld id="{6BA97E48-4B77-47E2-9936-39CB2FA99A68}" type="datetimeFigureOut">
               <a:rPr lang="en-US" smtClean="0"/>
-              <a:t>8/24/2019</a:t>
+              <a:t>8/25/2019</a:t>
             </a:fld>
             <a:endParaRPr lang="en-US"/>
           </a:p>
@@ -3759,7 +3872,7 @@
           <a:p>
             <a:fld id="{6BA97E48-4B77-47E2-9936-39CB2FA99A68}" type="datetimeFigureOut">
               <a:rPr lang="en-US" smtClean="0"/>
-              <a:t>8/24/2019</a:t>
+              <a:t>8/25/2019</a:t>
             </a:fld>
             <a:endParaRPr lang="en-US"/>
           </a:p>
@@ -4047,7 +4160,7 @@
           <a:p>
             <a:fld id="{6BA97E48-4B77-47E2-9936-39CB2FA99A68}" type="datetimeFigureOut">
               <a:rPr lang="en-US" smtClean="0"/>
-              <a:t>8/24/2019</a:t>
+              <a:t>8/25/2019</a:t>
             </a:fld>
             <a:endParaRPr lang="en-US"/>
           </a:p>
@@ -4288,7 +4401,7 @@
           <a:p>
             <a:fld id="{6BA97E48-4B77-47E2-9936-39CB2FA99A68}" type="datetimeFigureOut">
               <a:rPr lang="en-US" smtClean="0"/>
-              <a:t>8/24/2019</a:t>
+              <a:t>8/25/2019</a:t>
             </a:fld>
             <a:endParaRPr lang="en-US"/>
           </a:p>
@@ -4777,7 +4890,7 @@
             </a:r>
             <a:r>
               <a:rPr lang="en-US" b="1" dirty="0"/>
-              <a:t>Consumer Staples</a:t>
+              <a:t>Consumer Staples at approximately 5.7 trillion dollars</a:t>
             </a:r>
             <a:r>
               <a:rPr lang="en-US" dirty="0"/>
@@ -4785,12 +4898,17 @@
             </a:r>
             <a:r>
               <a:rPr lang="en-US" b="1" dirty="0"/>
-              <a:t>Consumer Discretionary</a:t>
+              <a:t>Consumer Discretionary at approximately 5.6 trillion</a:t>
             </a:r>
             <a:r>
               <a:rPr lang="en-US" dirty="0"/>
-              <a:t>. The values for the average values are listed at the bottom of the graph, showing which sectors on average generate the highest amount of revenue.</a:t>
-            </a:r>
+              <a:t>. The values for the average values are listed at the bottom of the graph, showing which sectors on average generate the highest amount of revenue. The total Standard Deviation for the industry is </a:t>
+            </a:r>
+            <a:r>
+              <a:rPr lang="en-US" b="1" dirty="0"/>
+              <a:t> $ 41,638,455,339.42 .</a:t>
+            </a:r>
+            <a:endParaRPr lang="en-US" dirty="0"/>
           </a:p>
         </p:txBody>
       </p:sp>
@@ -4809,13 +4927,13 @@
           <p:nvPr>
             <p:extLst>
               <p:ext uri="{D42A27DB-BD31-4B8C-83A1-F6EECF244321}">
-                <p14:modId xmlns:p14="http://schemas.microsoft.com/office/powerpoint/2010/main" val="3069963356"/>
+                <p14:modId xmlns:p14="http://schemas.microsoft.com/office/powerpoint/2010/main" val="4030965728"/>
               </p:ext>
             </p:extLst>
           </p:nvPr>
         </p:nvGraphicFramePr>
         <p:xfrm>
-          <a:off x="-193041" y="1691132"/>
+          <a:off x="-12066" y="1691132"/>
           <a:ext cx="10738001" cy="5090657"/>
         </p:xfrm>
         <a:graphic>

</xml_diff>